<commit_message>
qr link viewing bug fixed
</commit_message>
<xml_diff>
--- a/virtual library.pptx
+++ b/virtual library.pptx
@@ -349,7 +349,7 @@
           <a:p>
             <a:fld id="{6699D665-718E-41F8-AD12-0CD6673DD19C}" type="datetimeFigureOut">
               <a:rPr lang="en-US" smtClean="0"/>
-              <a:t>3/13/2014</a:t>
+              <a:t>13-Mar-14</a:t>
             </a:fld>
             <a:endParaRPr lang="en-US"/>
           </a:p>
@@ -557,7 +557,7 @@
           <a:p>
             <a:fld id="{6699D665-718E-41F8-AD12-0CD6673DD19C}" type="datetimeFigureOut">
               <a:rPr lang="en-US" smtClean="0"/>
-              <a:t>3/13/2014</a:t>
+              <a:t>13-Mar-14</a:t>
             </a:fld>
             <a:endParaRPr lang="en-US"/>
           </a:p>
@@ -813,7 +813,7 @@
           <a:p>
             <a:fld id="{6699D665-718E-41F8-AD12-0CD6673DD19C}" type="datetimeFigureOut">
               <a:rPr lang="en-US" smtClean="0"/>
-              <a:t>3/13/2014</a:t>
+              <a:t>13-Mar-14</a:t>
             </a:fld>
             <a:endParaRPr lang="en-US"/>
           </a:p>
@@ -987,7 +987,7 @@
           <a:p>
             <a:fld id="{6699D665-718E-41F8-AD12-0CD6673DD19C}" type="datetimeFigureOut">
               <a:rPr lang="en-US" smtClean="0"/>
-              <a:t>3/13/2014</a:t>
+              <a:t>13-Mar-14</a:t>
             </a:fld>
             <a:endParaRPr lang="en-US"/>
           </a:p>
@@ -1330,7 +1330,7 @@
           <a:p>
             <a:fld id="{6699D665-718E-41F8-AD12-0CD6673DD19C}" type="datetimeFigureOut">
               <a:rPr lang="en-US" smtClean="0"/>
-              <a:t>3/13/2014</a:t>
+              <a:t>13-Mar-14</a:t>
             </a:fld>
             <a:endParaRPr lang="en-US"/>
           </a:p>
@@ -1605,7 +1605,7 @@
           <a:p>
             <a:fld id="{6699D665-718E-41F8-AD12-0CD6673DD19C}" type="datetimeFigureOut">
               <a:rPr lang="en-US" smtClean="0"/>
-              <a:t>3/13/2014</a:t>
+              <a:t>13-Mar-14</a:t>
             </a:fld>
             <a:endParaRPr lang="en-US"/>
           </a:p>
@@ -1984,7 +1984,7 @@
           <a:p>
             <a:fld id="{6699D665-718E-41F8-AD12-0CD6673DD19C}" type="datetimeFigureOut">
               <a:rPr lang="en-US" smtClean="0"/>
-              <a:t>3/13/2014</a:t>
+              <a:t>13-Mar-14</a:t>
             </a:fld>
             <a:endParaRPr lang="en-US"/>
           </a:p>
@@ -2102,7 +2102,7 @@
           <a:p>
             <a:fld id="{6699D665-718E-41F8-AD12-0CD6673DD19C}" type="datetimeFigureOut">
               <a:rPr lang="en-US" smtClean="0"/>
-              <a:t>3/13/2014</a:t>
+              <a:t>13-Mar-14</a:t>
             </a:fld>
             <a:endParaRPr lang="en-US"/>
           </a:p>
@@ -2273,7 +2273,7 @@
           <a:p>
             <a:fld id="{6699D665-718E-41F8-AD12-0CD6673DD19C}" type="datetimeFigureOut">
               <a:rPr lang="en-US" smtClean="0"/>
-              <a:t>3/13/2014</a:t>
+              <a:t>13-Mar-14</a:t>
             </a:fld>
             <a:endParaRPr lang="en-US"/>
           </a:p>
@@ -2627,7 +2627,7 @@
           <a:p>
             <a:fld id="{6699D665-718E-41F8-AD12-0CD6673DD19C}" type="datetimeFigureOut">
               <a:rPr lang="en-US" smtClean="0"/>
-              <a:t>3/13/2014</a:t>
+              <a:t>13-Mar-14</a:t>
             </a:fld>
             <a:endParaRPr lang="en-US"/>
           </a:p>
@@ -3009,7 +3009,7 @@
           <a:p>
             <a:fld id="{6699D665-718E-41F8-AD12-0CD6673DD19C}" type="datetimeFigureOut">
               <a:rPr lang="en-US" smtClean="0"/>
-              <a:t>3/13/2014</a:t>
+              <a:t>13-Mar-14</a:t>
             </a:fld>
             <a:endParaRPr lang="en-US"/>
           </a:p>
@@ -3296,7 +3296,7 @@
           <a:p>
             <a:fld id="{6699D665-718E-41F8-AD12-0CD6673DD19C}" type="datetimeFigureOut">
               <a:rPr lang="en-US" smtClean="0"/>
-              <a:t>3/13/2014</a:t>
+              <a:t>13-Mar-14</a:t>
             </a:fld>
             <a:endParaRPr lang="en-US"/>
           </a:p>
@@ -4120,19 +4120,7 @@
             </a:r>
             <a:r>
               <a:rPr lang="en-US" dirty="0" smtClean="0"/>
-              <a:t> </a:t>
-            </a:r>
-            <a:r>
-              <a:rPr lang="en-US" dirty="0" smtClean="0"/>
-              <a:t>and Cold Fusion  </a:t>
-            </a:r>
-            <a:r>
-              <a:rPr lang="en-US" dirty="0" smtClean="0"/>
-              <a:t>widgets in website for enhancing functionality in </a:t>
-            </a:r>
-            <a:r>
-              <a:rPr lang="en-US" dirty="0" smtClean="0"/>
-              <a:t>website</a:t>
+              <a:t> and Cold Fusion  widgets in website for enhancing functionality in website</a:t>
             </a:r>
           </a:p>
           <a:p>
@@ -4687,7 +4675,6 @@
               <a:rPr lang="en-US" sz="2400" b="1" dirty="0"/>
               <a:t>Author / Content Manager reputation </a:t>
             </a:r>
-            <a:endParaRPr lang="en-US" sz="2400" b="1" dirty="0"/>
           </a:p>
           <a:p>
             <a:pPr marL="0" indent="0">
@@ -5159,7 +5146,6 @@
               <a:rPr lang="en-US" sz="2400" b="1" dirty="0"/>
               <a:t>Flag of Inappropriate content</a:t>
             </a:r>
-            <a:endParaRPr lang="en-US" sz="2400" b="1" dirty="0"/>
           </a:p>
           <a:p>
             <a:pPr marL="0" indent="0">
@@ -5183,7 +5169,6 @@
               <a:rPr lang="en-US" sz="2400" b="1" dirty="0"/>
               <a:t>Content of website</a:t>
             </a:r>
-            <a:endParaRPr lang="en-US" sz="2400" b="1" dirty="0"/>
           </a:p>
           <a:p>
             <a:pPr marL="0" indent="0">
@@ -5203,7 +5188,6 @@
               <a:rPr lang="en-US" sz="2400" b="1" dirty="0"/>
               <a:t>Upload of Content</a:t>
             </a:r>
-            <a:endParaRPr lang="en-US" sz="2400" b="1" dirty="0"/>
           </a:p>
           <a:p>
             <a:pPr marL="0" indent="0">
@@ -5394,11 +5378,7 @@
             </a:pPr>
             <a:r>
               <a:rPr lang="en-US" sz="2000" dirty="0"/>
-              <a:t> </a:t>
-            </a:r>
-            <a:r>
-              <a:rPr lang="en-US" sz="2000" dirty="0"/>
-              <a:t>           Student performance is evaluated on the basis of test given by the student which should be preferably given at the end of the course</a:t>
+              <a:t>            Student performance is evaluated on the basis of test given by the student which should be preferably given at the end of the course</a:t>
             </a:r>
           </a:p>
         </p:txBody>
@@ -5450,7 +5430,11 @@
           <a:p>
             <a:r>
               <a:rPr lang="en-IN" dirty="0" smtClean="0"/>
-              <a:t>Salient Feature</a:t>
+              <a:t>Salient </a:t>
+            </a:r>
+            <a:r>
+              <a:rPr lang="en-IN" dirty="0" smtClean="0"/>
+              <a:t>Features</a:t>
             </a:r>
             <a:endParaRPr lang="en-IN" dirty="0"/>
           </a:p>
@@ -5511,9 +5495,40 @@
             </a:r>
             <a:r>
               <a:rPr lang="en-IN" dirty="0" smtClean="0"/>
-              <a:t>              We also have enabled feature of viewing user profile by other users in forums</a:t>
-            </a:r>
-            <a:endParaRPr lang="en-IN" dirty="0"/>
+              <a:t>              We also have enabled feature of viewing user profile by other users in </a:t>
+            </a:r>
+            <a:r>
+              <a:rPr lang="en-IN" dirty="0" smtClean="0"/>
+              <a:t>forums</a:t>
+            </a:r>
+          </a:p>
+          <a:p>
+            <a:pPr>
+              <a:buFont typeface="Wingdings" panose="05000000000000000000" pitchFamily="2" charset="2"/>
+              <a:buChar char="q"/>
+            </a:pPr>
+            <a:r>
+              <a:rPr lang="en-IN" sz="2400" b="1" dirty="0" smtClean="0"/>
+              <a:t>Download of resources</a:t>
+            </a:r>
+          </a:p>
+          <a:p>
+            <a:pPr marL="0" indent="0">
+              <a:buNone/>
+            </a:pPr>
+            <a:r>
+              <a:rPr lang="en-IN" sz="2400" b="1" dirty="0"/>
+              <a:t>	</a:t>
+            </a:r>
+            <a:r>
+              <a:rPr lang="en-IN" dirty="0" smtClean="0"/>
+              <a:t>If permitted, users can download the course resources uploaded by author. This simplifies offline and quick viewing </a:t>
+            </a:r>
+            <a:r>
+              <a:rPr lang="en-IN" smtClean="0"/>
+              <a:t>of resource</a:t>
+            </a:r>
+            <a:endParaRPr lang="en-IN" sz="2400" b="1" dirty="0"/>
           </a:p>
         </p:txBody>
       </p:sp>

</xml_diff>